<commit_message>
add more points to the documentation
</commit_message>
<xml_diff>
--- a/documents/Presentation.pptx
+++ b/documents/Presentation.pptx
@@ -113,6 +113,11 @@
       </a:defRPr>
     </a:lvl9pPr>
   </p:defaultTextStyle>
+  <p:extLst>
+    <p:ext uri="{EFAFB233-063F-42B5-8137-9DF3F51BA10A}">
+      <p15:sldGuideLst xmlns:p15="http://schemas.microsoft.com/office/powerpoint/2012/main"/>
+    </p:ext>
+  </p:extLst>
 </p:presentation>
 </file>
 
@@ -479,7 +484,7 @@
           <a:p>
             <a:fld id="{BCAE4FB3-EA23-4379-9E54-8E845A0F386B}" type="datetimeFigureOut">
               <a:rPr lang="de-CH" smtClean="0"/>
-              <a:t>27.02.2020</a:t>
+              <a:t>01.03.2020</a:t>
             </a:fld>
             <a:endParaRPr lang="de-CH"/>
           </a:p>
@@ -638,7 +643,7 @@
           <a:p>
             <a:fld id="{43442039-5182-4E7F-8878-7B34EFC09B4D}" type="slidenum">
               <a:rPr lang="de-CH" smtClean="0"/>
-              <a:t>‹#›</a:t>
+              <a:t>‹Nr.›</a:t>
             </a:fld>
             <a:endParaRPr lang="de-CH"/>
           </a:p>
@@ -2120,7 +2125,7 @@
           <a:p>
             <a:fld id="{7C35E0C2-6BA3-4C22-BE47-E07A08182086}" type="datetimeFigureOut">
               <a:rPr lang="de-CH" smtClean="0"/>
-              <a:t>27.02.2020</a:t>
+              <a:t>01.03.2020</a:t>
             </a:fld>
             <a:endParaRPr lang="de-CH"/>
           </a:p>
@@ -2162,7 +2167,7 @@
           <a:p>
             <a:fld id="{2788AD88-86E4-4298-87B3-56447FB0B677}" type="slidenum">
               <a:rPr lang="de-CH" smtClean="0"/>
-              <a:t>‹#›</a:t>
+              <a:t>‹Nr.›</a:t>
             </a:fld>
             <a:endParaRPr lang="de-CH"/>
           </a:p>
@@ -2371,7 +2376,7 @@
           <a:p>
             <a:fld id="{7C35E0C2-6BA3-4C22-BE47-E07A08182086}" type="datetimeFigureOut">
               <a:rPr lang="de-CH" smtClean="0"/>
-              <a:t>27.02.2020</a:t>
+              <a:t>01.03.2020</a:t>
             </a:fld>
             <a:endParaRPr lang="de-CH"/>
           </a:p>
@@ -2413,7 +2418,7 @@
           <a:p>
             <a:fld id="{2788AD88-86E4-4298-87B3-56447FB0B677}" type="slidenum">
               <a:rPr lang="de-CH" smtClean="0"/>
-              <a:t>‹#›</a:t>
+              <a:t>‹Nr.›</a:t>
             </a:fld>
             <a:endParaRPr lang="de-CH"/>
           </a:p>
@@ -2685,7 +2690,7 @@
           <a:p>
             <a:fld id="{7C35E0C2-6BA3-4C22-BE47-E07A08182086}" type="datetimeFigureOut">
               <a:rPr lang="de-CH" smtClean="0"/>
-              <a:t>27.02.2020</a:t>
+              <a:t>01.03.2020</a:t>
             </a:fld>
             <a:endParaRPr lang="de-CH"/>
           </a:p>
@@ -2727,7 +2732,7 @@
           <a:p>
             <a:fld id="{2788AD88-86E4-4298-87B3-56447FB0B677}" type="slidenum">
               <a:rPr lang="de-CH" smtClean="0"/>
-              <a:t>‹#›</a:t>
+              <a:t>‹Nr.›</a:t>
             </a:fld>
             <a:endParaRPr lang="de-CH"/>
           </a:p>
@@ -3026,7 +3031,7 @@
           <a:p>
             <a:fld id="{7C35E0C2-6BA3-4C22-BE47-E07A08182086}" type="datetimeFigureOut">
               <a:rPr lang="de-CH" smtClean="0"/>
-              <a:t>27.02.2020</a:t>
+              <a:t>01.03.2020</a:t>
             </a:fld>
             <a:endParaRPr lang="de-CH"/>
           </a:p>
@@ -3068,7 +3073,7 @@
           <a:p>
             <a:fld id="{2788AD88-86E4-4298-87B3-56447FB0B677}" type="slidenum">
               <a:rPr lang="de-CH" smtClean="0"/>
-              <a:t>‹#›</a:t>
+              <a:t>‹Nr.›</a:t>
             </a:fld>
             <a:endParaRPr lang="de-CH"/>
           </a:p>
@@ -3340,7 +3345,7 @@
           <a:p>
             <a:fld id="{7C35E0C2-6BA3-4C22-BE47-E07A08182086}" type="datetimeFigureOut">
               <a:rPr lang="de-CH" smtClean="0"/>
-              <a:t>27.02.2020</a:t>
+              <a:t>01.03.2020</a:t>
             </a:fld>
             <a:endParaRPr lang="de-CH"/>
           </a:p>
@@ -3382,7 +3387,7 @@
           <a:p>
             <a:fld id="{2788AD88-86E4-4298-87B3-56447FB0B677}" type="slidenum">
               <a:rPr lang="de-CH" smtClean="0"/>
-              <a:t>‹#›</a:t>
+              <a:t>‹Nr.›</a:t>
             </a:fld>
             <a:endParaRPr lang="de-CH"/>
           </a:p>
@@ -3733,7 +3738,7 @@
           <a:p>
             <a:fld id="{7C35E0C2-6BA3-4C22-BE47-E07A08182086}" type="datetimeFigureOut">
               <a:rPr lang="de-CH" smtClean="0"/>
-              <a:t>27.02.2020</a:t>
+              <a:t>01.03.2020</a:t>
             </a:fld>
             <a:endParaRPr lang="de-CH"/>
           </a:p>
@@ -3775,7 +3780,7 @@
           <a:p>
             <a:fld id="{2788AD88-86E4-4298-87B3-56447FB0B677}" type="slidenum">
               <a:rPr lang="de-CH" smtClean="0"/>
-              <a:t>‹#›</a:t>
+              <a:t>‹Nr.›</a:t>
             </a:fld>
             <a:endParaRPr lang="de-CH"/>
           </a:p>
@@ -3903,7 +3908,7 @@
           <a:p>
             <a:fld id="{7C35E0C2-6BA3-4C22-BE47-E07A08182086}" type="datetimeFigureOut">
               <a:rPr lang="de-CH" smtClean="0"/>
-              <a:t>27.02.2020</a:t>
+              <a:t>01.03.2020</a:t>
             </a:fld>
             <a:endParaRPr lang="de-CH"/>
           </a:p>
@@ -3945,7 +3950,7 @@
           <a:p>
             <a:fld id="{2788AD88-86E4-4298-87B3-56447FB0B677}" type="slidenum">
               <a:rPr lang="de-CH" smtClean="0"/>
-              <a:t>‹#›</a:t>
+              <a:t>‹Nr.›</a:t>
             </a:fld>
             <a:endParaRPr lang="de-CH"/>
           </a:p>
@@ -4083,7 +4088,7 @@
           <a:p>
             <a:fld id="{7C35E0C2-6BA3-4C22-BE47-E07A08182086}" type="datetimeFigureOut">
               <a:rPr lang="de-CH" smtClean="0"/>
-              <a:t>27.02.2020</a:t>
+              <a:t>01.03.2020</a:t>
             </a:fld>
             <a:endParaRPr lang="de-CH"/>
           </a:p>
@@ -4125,7 +4130,7 @@
           <a:p>
             <a:fld id="{2788AD88-86E4-4298-87B3-56447FB0B677}" type="slidenum">
               <a:rPr lang="de-CH" smtClean="0"/>
-              <a:t>‹#›</a:t>
+              <a:t>‹Nr.›</a:t>
             </a:fld>
             <a:endParaRPr lang="de-CH"/>
           </a:p>
@@ -4259,7 +4264,7 @@
           <a:p>
             <a:fld id="{7C35E0C2-6BA3-4C22-BE47-E07A08182086}" type="datetimeFigureOut">
               <a:rPr lang="de-CH" smtClean="0"/>
-              <a:t>27.02.2020</a:t>
+              <a:t>01.03.2020</a:t>
             </a:fld>
             <a:endParaRPr lang="de-CH"/>
           </a:p>
@@ -4301,7 +4306,7 @@
           <a:p>
             <a:fld id="{2788AD88-86E4-4298-87B3-56447FB0B677}" type="slidenum">
               <a:rPr lang="de-CH" smtClean="0"/>
-              <a:t>‹#›</a:t>
+              <a:t>‹Nr.›</a:t>
             </a:fld>
             <a:endParaRPr lang="de-CH"/>
           </a:p>
@@ -4506,7 +4511,7 @@
           <a:p>
             <a:fld id="{7C35E0C2-6BA3-4C22-BE47-E07A08182086}" type="datetimeFigureOut">
               <a:rPr lang="de-CH" smtClean="0"/>
-              <a:t>27.02.2020</a:t>
+              <a:t>01.03.2020</a:t>
             </a:fld>
             <a:endParaRPr lang="de-CH"/>
           </a:p>
@@ -4548,7 +4553,7 @@
           <a:p>
             <a:fld id="{2788AD88-86E4-4298-87B3-56447FB0B677}" type="slidenum">
               <a:rPr lang="de-CH" smtClean="0"/>
-              <a:t>‹#›</a:t>
+              <a:t>‹Nr.›</a:t>
             </a:fld>
             <a:endParaRPr lang="de-CH"/>
           </a:p>
@@ -4738,7 +4743,7 @@
           <a:p>
             <a:fld id="{7C35E0C2-6BA3-4C22-BE47-E07A08182086}" type="datetimeFigureOut">
               <a:rPr lang="de-CH" smtClean="0"/>
-              <a:t>27.02.2020</a:t>
+              <a:t>01.03.2020</a:t>
             </a:fld>
             <a:endParaRPr lang="de-CH"/>
           </a:p>
@@ -4780,7 +4785,7 @@
           <a:p>
             <a:fld id="{2788AD88-86E4-4298-87B3-56447FB0B677}" type="slidenum">
               <a:rPr lang="de-CH" smtClean="0"/>
-              <a:t>‹#›</a:t>
+              <a:t>‹Nr.›</a:t>
             </a:fld>
             <a:endParaRPr lang="de-CH"/>
           </a:p>
@@ -5112,7 +5117,7 @@
           <a:p>
             <a:fld id="{7C35E0C2-6BA3-4C22-BE47-E07A08182086}" type="datetimeFigureOut">
               <a:rPr lang="de-CH" smtClean="0"/>
-              <a:t>27.02.2020</a:t>
+              <a:t>01.03.2020</a:t>
             </a:fld>
             <a:endParaRPr lang="de-CH"/>
           </a:p>
@@ -5154,7 +5159,7 @@
           <a:p>
             <a:fld id="{2788AD88-86E4-4298-87B3-56447FB0B677}" type="slidenum">
               <a:rPr lang="de-CH" smtClean="0"/>
-              <a:t>‹#›</a:t>
+              <a:t>‹Nr.›</a:t>
             </a:fld>
             <a:endParaRPr lang="de-CH"/>
           </a:p>
@@ -5235,7 +5240,7 @@
           <a:p>
             <a:fld id="{7C35E0C2-6BA3-4C22-BE47-E07A08182086}" type="datetimeFigureOut">
               <a:rPr lang="de-CH" smtClean="0"/>
-              <a:t>27.02.2020</a:t>
+              <a:t>01.03.2020</a:t>
             </a:fld>
             <a:endParaRPr lang="de-CH"/>
           </a:p>
@@ -5277,7 +5282,7 @@
           <a:p>
             <a:fld id="{2788AD88-86E4-4298-87B3-56447FB0B677}" type="slidenum">
               <a:rPr lang="de-CH" smtClean="0"/>
-              <a:t>‹#›</a:t>
+              <a:t>‹Nr.›</a:t>
             </a:fld>
             <a:endParaRPr lang="de-CH"/>
           </a:p>
@@ -5330,7 +5335,7 @@
           <a:p>
             <a:fld id="{7C35E0C2-6BA3-4C22-BE47-E07A08182086}" type="datetimeFigureOut">
               <a:rPr lang="de-CH" smtClean="0"/>
-              <a:t>27.02.2020</a:t>
+              <a:t>01.03.2020</a:t>
             </a:fld>
             <a:endParaRPr lang="de-CH"/>
           </a:p>
@@ -5372,7 +5377,7 @@
           <a:p>
             <a:fld id="{2788AD88-86E4-4298-87B3-56447FB0B677}" type="slidenum">
               <a:rPr lang="de-CH" smtClean="0"/>
-              <a:t>‹#›</a:t>
+              <a:t>‹Nr.›</a:t>
             </a:fld>
             <a:endParaRPr lang="de-CH"/>
           </a:p>
@@ -5585,7 +5590,7 @@
           <a:p>
             <a:fld id="{7C35E0C2-6BA3-4C22-BE47-E07A08182086}" type="datetimeFigureOut">
               <a:rPr lang="de-CH" smtClean="0"/>
-              <a:t>27.02.2020</a:t>
+              <a:t>01.03.2020</a:t>
             </a:fld>
             <a:endParaRPr lang="de-CH"/>
           </a:p>
@@ -5627,7 +5632,7 @@
           <a:p>
             <a:fld id="{2788AD88-86E4-4298-87B3-56447FB0B677}" type="slidenum">
               <a:rPr lang="de-CH" smtClean="0"/>
-              <a:t>‹#›</a:t>
+              <a:t>‹Nr.›</a:t>
             </a:fld>
             <a:endParaRPr lang="de-CH"/>
           </a:p>
@@ -5848,7 +5853,7 @@
           <a:p>
             <a:fld id="{7C35E0C2-6BA3-4C22-BE47-E07A08182086}" type="datetimeFigureOut">
               <a:rPr lang="de-CH" smtClean="0"/>
-              <a:t>27.02.2020</a:t>
+              <a:t>01.03.2020</a:t>
             </a:fld>
             <a:endParaRPr lang="de-CH"/>
           </a:p>
@@ -5890,7 +5895,7 @@
           <a:p>
             <a:fld id="{2788AD88-86E4-4298-87B3-56447FB0B677}" type="slidenum">
               <a:rPr lang="de-CH" smtClean="0"/>
-              <a:t>‹#›</a:t>
+              <a:t>‹Nr.›</a:t>
             </a:fld>
             <a:endParaRPr lang="de-CH"/>
           </a:p>
@@ -6591,7 +6596,7 @@
           <a:p>
             <a:fld id="{7C35E0C2-6BA3-4C22-BE47-E07A08182086}" type="datetimeFigureOut">
               <a:rPr lang="de-CH" smtClean="0"/>
-              <a:t>27.02.2020</a:t>
+              <a:t>01.03.2020</a:t>
             </a:fld>
             <a:endParaRPr lang="de-CH"/>
           </a:p>
@@ -6667,7 +6672,7 @@
           <a:p>
             <a:fld id="{2788AD88-86E4-4298-87B3-56447FB0B677}" type="slidenum">
               <a:rPr lang="de-CH" smtClean="0"/>
-              <a:t>‹#›</a:t>
+              <a:t>‹Nr.›</a:t>
             </a:fld>
             <a:endParaRPr lang="de-CH"/>
           </a:p>
@@ -7937,10 +7942,9 @@
           <a:lstStyle/>
           <a:p>
             <a:r>
-              <a:rPr lang="en-US" dirty="0" err="1"/>
+              <a:rPr lang="de-CH" dirty="0"/>
               <a:t>Fragen</a:t>
             </a:r>
-            <a:endParaRPr lang="de-CH" dirty="0"/>
           </a:p>
         </p:txBody>
       </p:sp>

</xml_diff>